<commit_message>
Adding some code samples showing off various types of mocks. Updating slides.
</commit_message>
<xml_diff>
--- a/Samples/whats-the-deals-with-rhino.mocks/Whats the Deal with Rhino.Mocks.pptx
+++ b/Samples/whats-the-deals-with-rhino.mocks/Whats the Deal with Rhino.Mocks.pptx
@@ -206,7 +206,7 @@
             <a:fld id="{BD324B9B-0568-4D2A-ACF4-C7174E679156}" type="datetimeFigureOut">
               <a:rPr lang="en-US" smtClean="0"/>
               <a:pPr/>
-              <a:t>5/10/2008</a:t>
+              <a:t>5/21/2008</a:t>
             </a:fld>
             <a:endParaRPr lang="en-US"/>
           </a:p>
@@ -1622,7 +1622,7 @@
             <a:fld id="{2B91BA72-E911-4FAD-831E-892CA3FE30B0}" type="datetimeFigureOut">
               <a:rPr lang="en-US" smtClean="0"/>
               <a:pPr/>
-              <a:t>5/10/2008</a:t>
+              <a:t>5/21/2008</a:t>
             </a:fld>
             <a:endParaRPr lang="en-US"/>
           </a:p>
@@ -1884,7 +1884,7 @@
             <a:fld id="{2B91BA72-E911-4FAD-831E-892CA3FE30B0}" type="datetimeFigureOut">
               <a:rPr lang="en-US" smtClean="0"/>
               <a:pPr/>
-              <a:t>5/10/2008</a:t>
+              <a:t>5/21/2008</a:t>
             </a:fld>
             <a:endParaRPr lang="en-US"/>
           </a:p>
@@ -2166,7 +2166,7 @@
             <a:fld id="{2B91BA72-E911-4FAD-831E-892CA3FE30B0}" type="datetimeFigureOut">
               <a:rPr lang="en-US" smtClean="0"/>
               <a:pPr/>
-              <a:t>5/10/2008</a:t>
+              <a:t>5/21/2008</a:t>
             </a:fld>
             <a:endParaRPr lang="en-US"/>
           </a:p>
@@ -2347,7 +2347,7 @@
             <a:fld id="{2B91BA72-E911-4FAD-831E-892CA3FE30B0}" type="datetimeFigureOut">
               <a:rPr lang="en-US" smtClean="0"/>
               <a:pPr/>
-              <a:t>5/10/2008</a:t>
+              <a:t>5/21/2008</a:t>
             </a:fld>
             <a:endParaRPr lang="en-US"/>
           </a:p>
@@ -2707,7 +2707,7 @@
             <a:fld id="{2B91BA72-E911-4FAD-831E-892CA3FE30B0}" type="datetimeFigureOut">
               <a:rPr lang="en-US" smtClean="0"/>
               <a:pPr/>
-              <a:t>5/10/2008</a:t>
+              <a:t>5/21/2008</a:t>
             </a:fld>
             <a:endParaRPr lang="en-US"/>
           </a:p>
@@ -3033,7 +3033,7 @@
             <a:fld id="{2B91BA72-E911-4FAD-831E-892CA3FE30B0}" type="datetimeFigureOut">
               <a:rPr lang="en-US" smtClean="0"/>
               <a:pPr/>
-              <a:t>5/10/2008</a:t>
+              <a:t>5/21/2008</a:t>
             </a:fld>
             <a:endParaRPr lang="en-US"/>
           </a:p>
@@ -3457,7 +3457,7 @@
             <a:fld id="{2B91BA72-E911-4FAD-831E-892CA3FE30B0}" type="datetimeFigureOut">
               <a:rPr lang="en-US" smtClean="0"/>
               <a:pPr/>
-              <a:t>5/10/2008</a:t>
+              <a:t>5/21/2008</a:t>
             </a:fld>
             <a:endParaRPr lang="en-US"/>
           </a:p>
@@ -3574,7 +3574,7 @@
             <a:fld id="{2B91BA72-E911-4FAD-831E-892CA3FE30B0}" type="datetimeFigureOut">
               <a:rPr lang="en-US" smtClean="0"/>
               <a:pPr/>
-              <a:t>5/10/2008</a:t>
+              <a:t>5/21/2008</a:t>
             </a:fld>
             <a:endParaRPr lang="en-US"/>
           </a:p>
@@ -3666,7 +3666,7 @@
             <a:fld id="{2B91BA72-E911-4FAD-831E-892CA3FE30B0}" type="datetimeFigureOut">
               <a:rPr lang="en-US" smtClean="0"/>
               <a:pPr/>
-              <a:t>5/10/2008</a:t>
+              <a:t>5/21/2008</a:t>
             </a:fld>
             <a:endParaRPr lang="en-US"/>
           </a:p>
@@ -3946,7 +3946,7 @@
             <a:fld id="{2B91BA72-E911-4FAD-831E-892CA3FE30B0}" type="datetimeFigureOut">
               <a:rPr lang="en-US" smtClean="0"/>
               <a:pPr/>
-              <a:t>5/10/2008</a:t>
+              <a:t>5/21/2008</a:t>
             </a:fld>
             <a:endParaRPr lang="en-US"/>
           </a:p>
@@ -4314,7 +4314,7 @@
             <a:fld id="{2B91BA72-E911-4FAD-831E-892CA3FE30B0}" type="datetimeFigureOut">
               <a:rPr lang="en-US" smtClean="0"/>
               <a:pPr/>
-              <a:t>5/10/2008</a:t>
+              <a:t>5/21/2008</a:t>
             </a:fld>
             <a:endParaRPr lang="en-US"/>
           </a:p>
@@ -4753,7 +4753,7 @@
             <a:fld id="{2B91BA72-E911-4FAD-831E-892CA3FE30B0}" type="datetimeFigureOut">
               <a:rPr lang="en-US" smtClean="0"/>
               <a:pPr/>
-              <a:t>5/10/2008</a:t>
+              <a:t>5/21/2008</a:t>
             </a:fld>
             <a:endParaRPr lang="en-US"/>
           </a:p>
@@ -5512,7 +5512,6 @@
               <a:rPr lang="en-US" dirty="0" smtClean="0"/>
               <a:t>Partial</a:t>
             </a:r>
-            <a:endParaRPr lang="en-US" dirty="0" smtClean="0"/>
           </a:p>
           <a:p>
             <a:endParaRPr lang="en-US" dirty="0" smtClean="0"/>
@@ -5538,13 +5537,6 @@
               </a:rPr>
               <a:t> (coming soon)</a:t>
             </a:r>
-            <a:endParaRPr lang="en-US" dirty="0" smtClean="0">
-              <a:solidFill>
-                <a:schemeClr val="bg2">
-                  <a:lumMod val="50000"/>
-                </a:schemeClr>
-              </a:solidFill>
-            </a:endParaRPr>
           </a:p>
         </p:txBody>
       </p:sp>
@@ -5604,11 +5596,7 @@
           <a:p>
             <a:r>
               <a:rPr lang="en-US" dirty="0" smtClean="0"/>
-              <a:t>Structure of a </a:t>
-            </a:r>
-            <a:r>
-              <a:rPr lang="en-US" dirty="0" smtClean="0"/>
-              <a:t>(mocked) test</a:t>
+              <a:t>Structure of a (mocked) test</a:t>
             </a:r>
             <a:endParaRPr lang="en-US" dirty="0"/>
           </a:p>
@@ -5993,10 +5981,16 @@
           <a:p>
             <a:pPr lvl="1"/>
             <a:r>
-              <a:rPr lang="en-US" dirty="0" smtClean="0">
+              <a:rPr lang="en-US" smtClean="0">
                 <a:hlinkClick r:id="rId3"/>
               </a:rPr>
-              <a:t>http://code.google.com/p/codeincubator/</a:t>
+              <a:t>http</a:t>
+            </a:r>
+            <a:r>
+              <a:rPr lang="en-US" smtClean="0">
+                <a:hlinkClick r:id="rId3"/>
+              </a:rPr>
+              <a:t>://codeincubator.com</a:t>
             </a:r>
             <a:endParaRPr lang="en-US" dirty="0" smtClean="0"/>
           </a:p>

</xml_diff>

<commit_message>
Adding AAA syntax to slides
</commit_message>
<xml_diff>
--- a/Samples/whats-the-deals-with-rhino.mocks/Whats the Deal with Rhino.Mocks.pptx
+++ b/Samples/whats-the-deals-with-rhino.mocks/Whats the Deal with Rhino.Mocks.pptx
@@ -5,7 +5,7 @@
     <p:sldMasterId id="2147483672" r:id="rId1"/>
   </p:sldMasterIdLst>
   <p:notesMasterIdLst>
-    <p:notesMasterId r:id="rId16"/>
+    <p:notesMasterId r:id="rId17"/>
   </p:notesMasterIdLst>
   <p:sldIdLst>
     <p:sldId id="256" r:id="rId2"/>
@@ -20,8 +20,9 @@
     <p:sldId id="257" r:id="rId11"/>
     <p:sldId id="269" r:id="rId12"/>
     <p:sldId id="260" r:id="rId13"/>
-    <p:sldId id="261" r:id="rId14"/>
-    <p:sldId id="262" r:id="rId15"/>
+    <p:sldId id="270" r:id="rId14"/>
+    <p:sldId id="261" r:id="rId15"/>
+    <p:sldId id="262" r:id="rId16"/>
   </p:sldIdLst>
   <p:sldSz cx="9144000" cy="6858000" type="screen4x3"/>
   <p:notesSz cx="6858000" cy="9144000"/>
@@ -206,7 +207,7 @@
             <a:fld id="{BD324B9B-0568-4D2A-ACF4-C7174E679156}" type="datetimeFigureOut">
               <a:rPr lang="en-US" smtClean="0"/>
               <a:pPr/>
-              <a:t>5/21/2008</a:t>
+              <a:t>6/18/2008</a:t>
             </a:fld>
             <a:endParaRPr lang="en-US"/>
           </a:p>
@@ -1622,7 +1623,7 @@
             <a:fld id="{2B91BA72-E911-4FAD-831E-892CA3FE30B0}" type="datetimeFigureOut">
               <a:rPr lang="en-US" smtClean="0"/>
               <a:pPr/>
-              <a:t>5/21/2008</a:t>
+              <a:t>6/18/2008</a:t>
             </a:fld>
             <a:endParaRPr lang="en-US"/>
           </a:p>
@@ -1884,7 +1885,7 @@
             <a:fld id="{2B91BA72-E911-4FAD-831E-892CA3FE30B0}" type="datetimeFigureOut">
               <a:rPr lang="en-US" smtClean="0"/>
               <a:pPr/>
-              <a:t>5/21/2008</a:t>
+              <a:t>6/18/2008</a:t>
             </a:fld>
             <a:endParaRPr lang="en-US"/>
           </a:p>
@@ -2166,7 +2167,7 @@
             <a:fld id="{2B91BA72-E911-4FAD-831E-892CA3FE30B0}" type="datetimeFigureOut">
               <a:rPr lang="en-US" smtClean="0"/>
               <a:pPr/>
-              <a:t>5/21/2008</a:t>
+              <a:t>6/18/2008</a:t>
             </a:fld>
             <a:endParaRPr lang="en-US"/>
           </a:p>
@@ -2347,7 +2348,7 @@
             <a:fld id="{2B91BA72-E911-4FAD-831E-892CA3FE30B0}" type="datetimeFigureOut">
               <a:rPr lang="en-US" smtClean="0"/>
               <a:pPr/>
-              <a:t>5/21/2008</a:t>
+              <a:t>6/18/2008</a:t>
             </a:fld>
             <a:endParaRPr lang="en-US"/>
           </a:p>
@@ -2707,7 +2708,7 @@
             <a:fld id="{2B91BA72-E911-4FAD-831E-892CA3FE30B0}" type="datetimeFigureOut">
               <a:rPr lang="en-US" smtClean="0"/>
               <a:pPr/>
-              <a:t>5/21/2008</a:t>
+              <a:t>6/18/2008</a:t>
             </a:fld>
             <a:endParaRPr lang="en-US"/>
           </a:p>
@@ -3033,7 +3034,7 @@
             <a:fld id="{2B91BA72-E911-4FAD-831E-892CA3FE30B0}" type="datetimeFigureOut">
               <a:rPr lang="en-US" smtClean="0"/>
               <a:pPr/>
-              <a:t>5/21/2008</a:t>
+              <a:t>6/18/2008</a:t>
             </a:fld>
             <a:endParaRPr lang="en-US"/>
           </a:p>
@@ -3457,7 +3458,7 @@
             <a:fld id="{2B91BA72-E911-4FAD-831E-892CA3FE30B0}" type="datetimeFigureOut">
               <a:rPr lang="en-US" smtClean="0"/>
               <a:pPr/>
-              <a:t>5/21/2008</a:t>
+              <a:t>6/18/2008</a:t>
             </a:fld>
             <a:endParaRPr lang="en-US"/>
           </a:p>
@@ -3574,7 +3575,7 @@
             <a:fld id="{2B91BA72-E911-4FAD-831E-892CA3FE30B0}" type="datetimeFigureOut">
               <a:rPr lang="en-US" smtClean="0"/>
               <a:pPr/>
-              <a:t>5/21/2008</a:t>
+              <a:t>6/18/2008</a:t>
             </a:fld>
             <a:endParaRPr lang="en-US"/>
           </a:p>
@@ -3666,7 +3667,7 @@
             <a:fld id="{2B91BA72-E911-4FAD-831E-892CA3FE30B0}" type="datetimeFigureOut">
               <a:rPr lang="en-US" smtClean="0"/>
               <a:pPr/>
-              <a:t>5/21/2008</a:t>
+              <a:t>6/18/2008</a:t>
             </a:fld>
             <a:endParaRPr lang="en-US"/>
           </a:p>
@@ -3946,7 +3947,7 @@
             <a:fld id="{2B91BA72-E911-4FAD-831E-892CA3FE30B0}" type="datetimeFigureOut">
               <a:rPr lang="en-US" smtClean="0"/>
               <a:pPr/>
-              <a:t>5/21/2008</a:t>
+              <a:t>6/18/2008</a:t>
             </a:fld>
             <a:endParaRPr lang="en-US"/>
           </a:p>
@@ -4314,7 +4315,7 @@
             <a:fld id="{2B91BA72-E911-4FAD-831E-892CA3FE30B0}" type="datetimeFigureOut">
               <a:rPr lang="en-US" smtClean="0"/>
               <a:pPr/>
-              <a:t>5/21/2008</a:t>
+              <a:t>6/18/2008</a:t>
             </a:fld>
             <a:endParaRPr lang="en-US"/>
           </a:p>
@@ -4753,7 +4754,7 @@
             <a:fld id="{2B91BA72-E911-4FAD-831E-892CA3FE30B0}" type="datetimeFigureOut">
               <a:rPr lang="en-US" smtClean="0"/>
               <a:pPr/>
-              <a:t>5/21/2008</a:t>
+              <a:t>6/18/2008</a:t>
             </a:fld>
             <a:endParaRPr lang="en-US"/>
           </a:p>
@@ -5518,16 +5519,6 @@
           </a:p>
           <a:p>
             <a:r>
-              <a:rPr lang="en-US" dirty="0" err="1" smtClean="0">
-                <a:solidFill>
-                  <a:schemeClr val="bg2">
-                    <a:lumMod val="50000"/>
-                  </a:schemeClr>
-                </a:solidFill>
-              </a:rPr>
-              <a:t>ToBeNamedMock</a:t>
-            </a:r>
-            <a:r>
               <a:rPr lang="en-US" dirty="0" smtClean="0">
                 <a:solidFill>
                   <a:schemeClr val="bg2">
@@ -5535,8 +5526,15 @@
                   </a:schemeClr>
                 </a:solidFill>
               </a:rPr>
-              <a:t> (coming soon)</a:t>
-            </a:r>
+              <a:t>Arrange, Act, Assert</a:t>
+            </a:r>
+            <a:endParaRPr lang="en-US" dirty="0" smtClean="0">
+              <a:solidFill>
+                <a:schemeClr val="bg2">
+                  <a:lumMod val="50000"/>
+                </a:schemeClr>
+              </a:solidFill>
+            </a:endParaRPr>
           </a:p>
         </p:txBody>
       </p:sp>
@@ -5590,13 +5588,21 @@
         </p:spPr>
         <p:txBody>
           <a:bodyPr>
-            <a:normAutofit/>
+            <a:normAutofit fontScale="90000"/>
           </a:bodyPr>
           <a:lstStyle/>
           <a:p>
             <a:r>
               <a:rPr lang="en-US" dirty="0" smtClean="0"/>
-              <a:t>Structure of a (mocked) test</a:t>
+              <a:t>Structure of a </a:t>
+            </a:r>
+            <a:r>
+              <a:rPr lang="en-US" dirty="0" smtClean="0"/>
+              <a:t>Record/Playback </a:t>
+            </a:r>
+            <a:r>
+              <a:rPr lang="en-US" dirty="0" smtClean="0"/>
+              <a:t>test</a:t>
             </a:r>
             <a:endParaRPr lang="en-US" dirty="0"/>
           </a:p>
@@ -5633,7 +5639,15 @@
             </a:pPr>
             <a:r>
               <a:rPr lang="en-US" dirty="0" smtClean="0"/>
-              <a:t>Define expectations on the mocks</a:t>
+              <a:t>Define </a:t>
+            </a:r>
+            <a:r>
+              <a:rPr lang="en-US" dirty="0" smtClean="0"/>
+              <a:t>expectations/results </a:t>
+            </a:r>
+            <a:r>
+              <a:rPr lang="en-US" dirty="0" smtClean="0"/>
+              <a:t>on the mocks</a:t>
             </a:r>
           </a:p>
           <a:p>
@@ -5662,8 +5676,14 @@
               <a:buAutoNum type="arabicPeriod"/>
             </a:pPr>
             <a:r>
-              <a:rPr lang="en-US" dirty="0" smtClean="0"/>
-              <a:t>Additional asserts</a:t>
+              <a:rPr lang="en-US" dirty="0" smtClean="0">
+                <a:solidFill>
+                  <a:schemeClr val="bg2">
+                    <a:lumMod val="50000"/>
+                  </a:schemeClr>
+                </a:solidFill>
+              </a:rPr>
+              <a:t>Additional asserts [optional]</a:t>
             </a:r>
           </a:p>
         </p:txBody>
@@ -5743,30 +5763,12 @@
             <p:ph type="title"/>
           </p:nvPr>
         </p:nvSpPr>
-        <p:spPr/>
-        <p:txBody>
-          <a:bodyPr/>
-          <a:lstStyle/>
-          <a:p>
-            <a:r>
-              <a:rPr lang="en-US" dirty="0" smtClean="0"/>
-              <a:t>Enough chatter</a:t>
-            </a:r>
-            <a:endParaRPr lang="en-US" dirty="0"/>
-          </a:p>
-        </p:txBody>
-      </p:sp>
-      <p:sp>
-        <p:nvSpPr>
-          <p:cNvPr id="3" name="Text Placeholder 2"/>
-          <p:cNvSpPr>
-            <a:spLocks noGrp="1"/>
-          </p:cNvSpPr>
-          <p:nvPr>
-            <p:ph type="body" idx="1"/>
-          </p:nvPr>
-        </p:nvSpPr>
-        <p:spPr/>
+        <p:spPr>
+          <a:xfrm>
+            <a:off x="457200" y="155448"/>
+            <a:ext cx="8229600" cy="911352"/>
+          </a:xfrm>
+        </p:spPr>
         <p:txBody>
           <a:bodyPr>
             <a:normAutofit/>
@@ -5774,105 +5776,151 @@
           <a:lstStyle/>
           <a:p>
             <a:r>
-              <a:rPr lang="en-US" sz="2800" dirty="0" smtClean="0">
+              <a:rPr lang="en-US" dirty="0" smtClean="0"/>
+              <a:t>Structure of </a:t>
+            </a:r>
+            <a:r>
+              <a:rPr lang="en-US" dirty="0" smtClean="0"/>
+              <a:t>an AAA </a:t>
+            </a:r>
+            <a:r>
+              <a:rPr lang="en-US" dirty="0" smtClean="0"/>
+              <a:t>test</a:t>
+            </a:r>
+            <a:endParaRPr lang="en-US" dirty="0"/>
+          </a:p>
+        </p:txBody>
+      </p:sp>
+      <p:sp>
+        <p:nvSpPr>
+          <p:cNvPr id="3" name="Content Placeholder 2"/>
+          <p:cNvSpPr>
+            <a:spLocks noGrp="1"/>
+          </p:cNvSpPr>
+          <p:nvPr>
+            <p:ph idx="1"/>
+          </p:nvPr>
+        </p:nvSpPr>
+        <p:spPr/>
+        <p:txBody>
+          <a:bodyPr/>
+          <a:lstStyle/>
+          <a:p>
+            <a:pPr marL="633222" indent="-514350">
+              <a:buFont typeface="+mj-lt"/>
+              <a:buAutoNum type="arabicPeriod"/>
+            </a:pPr>
+            <a:r>
+              <a:rPr lang="en-US" dirty="0" smtClean="0"/>
+              <a:t>Create mocks</a:t>
+            </a:r>
+          </a:p>
+          <a:p>
+            <a:pPr marL="633222" indent="-514350">
+              <a:buFont typeface="+mj-lt"/>
+              <a:buAutoNum type="arabicPeriod"/>
+            </a:pPr>
+            <a:r>
+              <a:rPr lang="en-US" dirty="0" smtClean="0">
                 <a:solidFill>
-                  <a:schemeClr val="accent2">
-                    <a:lumMod val="20000"/>
-                    <a:lumOff val="80000"/>
+                  <a:schemeClr val="bg2">
+                    <a:lumMod val="50000"/>
                   </a:schemeClr>
                 </a:solidFill>
               </a:rPr>
-              <a:t>Lets see some code!</a:t>
-            </a:r>
+              <a:t>Stub results for the mocks [optional]</a:t>
+            </a:r>
+            <a:endParaRPr lang="en-US" dirty="0" smtClean="0">
+              <a:solidFill>
+                <a:schemeClr val="bg2">
+                  <a:lumMod val="50000"/>
+                </a:schemeClr>
+              </a:solidFill>
+            </a:endParaRPr>
+          </a:p>
+          <a:p>
+            <a:pPr marL="633222" indent="-514350">
+              <a:buFont typeface="+mj-lt"/>
+              <a:buAutoNum type="arabicPeriod"/>
+            </a:pPr>
+            <a:r>
+              <a:rPr lang="en-US" dirty="0" smtClean="0"/>
+              <a:t>Execute code under test</a:t>
+            </a:r>
+          </a:p>
+          <a:p>
+            <a:pPr marL="633222" indent="-514350">
+              <a:buFont typeface="+mj-lt"/>
+              <a:buAutoNum type="arabicPeriod"/>
+            </a:pPr>
+            <a:r>
+              <a:rPr lang="en-US" dirty="0" smtClean="0"/>
+              <a:t>Verify expectations</a:t>
+            </a:r>
+          </a:p>
+          <a:p>
+            <a:pPr marL="633222" indent="-514350">
+              <a:buFont typeface="+mj-lt"/>
+              <a:buAutoNum type="arabicPeriod"/>
+            </a:pPr>
+            <a:r>
+              <a:rPr lang="en-US" dirty="0" smtClean="0">
+                <a:solidFill>
+                  <a:schemeClr val="bg2">
+                    <a:lumMod val="50000"/>
+                  </a:schemeClr>
+                </a:solidFill>
+              </a:rPr>
+              <a:t>Additional </a:t>
+            </a:r>
+            <a:r>
+              <a:rPr lang="en-US" dirty="0" smtClean="0">
+                <a:solidFill>
+                  <a:schemeClr val="bg2">
+                    <a:lumMod val="50000"/>
+                  </a:schemeClr>
+                </a:solidFill>
+              </a:rPr>
+              <a:t>asserts [optional]</a:t>
+            </a:r>
+            <a:endParaRPr lang="en-US" dirty="0" smtClean="0">
+              <a:solidFill>
+                <a:schemeClr val="bg2">
+                  <a:lumMod val="50000"/>
+                </a:schemeClr>
+              </a:solidFill>
+            </a:endParaRPr>
+          </a:p>
+        </p:txBody>
+      </p:sp>
+      <p:sp>
+        <p:nvSpPr>
+          <p:cNvPr id="4" name="TextBox 3"/>
+          <p:cNvSpPr txBox="1"/>
+          <p:nvPr/>
+        </p:nvSpPr>
+        <p:spPr>
+          <a:xfrm>
+            <a:off x="762000" y="838200"/>
+            <a:ext cx="7848600" cy="523220"/>
+          </a:xfrm>
+          <a:prstGeom prst="rect">
+            <a:avLst/>
+          </a:prstGeom>
+          <a:noFill/>
+        </p:spPr>
+        <p:txBody>
+          <a:bodyPr wrap="square" rtlCol="0">
+            <a:spAutoFit/>
+          </a:bodyPr>
+          <a:lstStyle/>
+          <a:p>
             <a:endParaRPr lang="en-US" sz="2800" dirty="0">
               <a:solidFill>
                 <a:schemeClr val="accent2">
                   <a:lumMod val="20000"/>
                   <a:lumOff val="80000"/>
                 </a:schemeClr>
-              </a:solidFill>
-            </a:endParaRPr>
-          </a:p>
-        </p:txBody>
-      </p:sp>
-      <p:sp>
-        <p:nvSpPr>
-          <p:cNvPr id="5" name="TextBox 4"/>
-          <p:cNvSpPr txBox="1"/>
-          <p:nvPr/>
-        </p:nvSpPr>
-        <p:spPr>
-          <a:xfrm>
-            <a:off x="914400" y="3429000"/>
-            <a:ext cx="6553200" cy="1569660"/>
-          </a:xfrm>
-          <a:prstGeom prst="rect">
-            <a:avLst/>
-          </a:prstGeom>
-          <a:solidFill>
-            <a:schemeClr val="bg1">
-              <a:lumMod val="85000"/>
-              <a:lumOff val="15000"/>
-            </a:schemeClr>
-          </a:solidFill>
-        </p:spPr>
-        <p:txBody>
-          <a:bodyPr wrap="square" rtlCol="0">
-            <a:spAutoFit/>
-          </a:bodyPr>
-          <a:lstStyle/>
-          <a:p>
-            <a:r>
-              <a:rPr lang="en-US" sz="2400" dirty="0" smtClean="0">
-                <a:solidFill>
-                  <a:schemeClr val="accent1"/>
-                </a:solidFill>
-              </a:rPr>
-              <a:t>HAI</a:t>
-            </a:r>
-          </a:p>
-          <a:p>
-            <a:r>
-              <a:rPr lang="en-US" sz="2400" dirty="0" smtClean="0"/>
-              <a:t>    CAN HAS STDIO</a:t>
-            </a:r>
-            <a:r>
-              <a:rPr lang="en-US" sz="2400" dirty="0" smtClean="0">
-                <a:solidFill>
-                  <a:schemeClr val="accent2">
-                    <a:lumMod val="75000"/>
-                  </a:schemeClr>
-                </a:solidFill>
-              </a:rPr>
-              <a:t>?</a:t>
-            </a:r>
-          </a:p>
-          <a:p>
-            <a:r>
-              <a:rPr lang="en-US" sz="2400" dirty="0" smtClean="0"/>
-              <a:t>    VISIBLE </a:t>
-            </a:r>
-            <a:r>
-              <a:rPr lang="en-US" sz="2400" dirty="0" smtClean="0">
-                <a:solidFill>
-                  <a:srgbClr val="92D050"/>
-                </a:solidFill>
-              </a:rPr>
-              <a:t>"HAI WORLD!“</a:t>
-            </a:r>
-          </a:p>
-          <a:p>
-            <a:r>
-              <a:rPr lang="en-US" sz="2400" dirty="0" smtClean="0">
-                <a:solidFill>
-                  <a:schemeClr val="accent1"/>
-                </a:solidFill>
-              </a:rPr>
-              <a:t>KTHXBYE</a:t>
-            </a:r>
-            <a:endParaRPr lang="en-US" sz="2400" dirty="0">
-              <a:solidFill>
-                <a:schemeClr val="accent1"/>
               </a:solidFill>
             </a:endParaRPr>
           </a:p>
@@ -5926,6 +5974,183 @@
           <a:lstStyle/>
           <a:p>
             <a:r>
+              <a:rPr lang="en-US" dirty="0" smtClean="0"/>
+              <a:t>Enough chatter</a:t>
+            </a:r>
+            <a:endParaRPr lang="en-US" dirty="0"/>
+          </a:p>
+        </p:txBody>
+      </p:sp>
+      <p:sp>
+        <p:nvSpPr>
+          <p:cNvPr id="3" name="Text Placeholder 2"/>
+          <p:cNvSpPr>
+            <a:spLocks noGrp="1"/>
+          </p:cNvSpPr>
+          <p:nvPr>
+            <p:ph type="body" idx="1"/>
+          </p:nvPr>
+        </p:nvSpPr>
+        <p:spPr/>
+        <p:txBody>
+          <a:bodyPr>
+            <a:normAutofit/>
+          </a:bodyPr>
+          <a:lstStyle/>
+          <a:p>
+            <a:r>
+              <a:rPr lang="en-US" sz="2800" dirty="0" smtClean="0">
+                <a:solidFill>
+                  <a:schemeClr val="accent2">
+                    <a:lumMod val="20000"/>
+                    <a:lumOff val="80000"/>
+                  </a:schemeClr>
+                </a:solidFill>
+              </a:rPr>
+              <a:t>Lets see some code!</a:t>
+            </a:r>
+            <a:endParaRPr lang="en-US" sz="2800" dirty="0">
+              <a:solidFill>
+                <a:schemeClr val="accent2">
+                  <a:lumMod val="20000"/>
+                  <a:lumOff val="80000"/>
+                </a:schemeClr>
+              </a:solidFill>
+            </a:endParaRPr>
+          </a:p>
+        </p:txBody>
+      </p:sp>
+      <p:sp>
+        <p:nvSpPr>
+          <p:cNvPr id="5" name="TextBox 4"/>
+          <p:cNvSpPr txBox="1"/>
+          <p:nvPr/>
+        </p:nvSpPr>
+        <p:spPr>
+          <a:xfrm>
+            <a:off x="914400" y="3429000"/>
+            <a:ext cx="6553200" cy="1569660"/>
+          </a:xfrm>
+          <a:prstGeom prst="rect">
+            <a:avLst/>
+          </a:prstGeom>
+          <a:solidFill>
+            <a:schemeClr val="bg1">
+              <a:lumMod val="85000"/>
+              <a:lumOff val="15000"/>
+            </a:schemeClr>
+          </a:solidFill>
+        </p:spPr>
+        <p:txBody>
+          <a:bodyPr wrap="square" rtlCol="0">
+            <a:spAutoFit/>
+          </a:bodyPr>
+          <a:lstStyle/>
+          <a:p>
+            <a:r>
+              <a:rPr lang="en-US" sz="2400" dirty="0" smtClean="0">
+                <a:solidFill>
+                  <a:schemeClr val="accent1"/>
+                </a:solidFill>
+              </a:rPr>
+              <a:t>HAI</a:t>
+            </a:r>
+          </a:p>
+          <a:p>
+            <a:r>
+              <a:rPr lang="en-US" sz="2400" dirty="0" smtClean="0"/>
+              <a:t>    CAN HAS STDIO</a:t>
+            </a:r>
+            <a:r>
+              <a:rPr lang="en-US" sz="2400" dirty="0" smtClean="0">
+                <a:solidFill>
+                  <a:schemeClr val="accent2">
+                    <a:lumMod val="75000"/>
+                  </a:schemeClr>
+                </a:solidFill>
+              </a:rPr>
+              <a:t>?</a:t>
+            </a:r>
+          </a:p>
+          <a:p>
+            <a:r>
+              <a:rPr lang="en-US" sz="2400" dirty="0" smtClean="0"/>
+              <a:t>    VISIBLE </a:t>
+            </a:r>
+            <a:r>
+              <a:rPr lang="en-US" sz="2400" dirty="0" smtClean="0">
+                <a:solidFill>
+                  <a:srgbClr val="92D050"/>
+                </a:solidFill>
+              </a:rPr>
+              <a:t>"HAI WORLD!“</a:t>
+            </a:r>
+          </a:p>
+          <a:p>
+            <a:r>
+              <a:rPr lang="en-US" sz="2400" dirty="0" smtClean="0">
+                <a:solidFill>
+                  <a:schemeClr val="accent1"/>
+                </a:solidFill>
+              </a:rPr>
+              <a:t>KTHXBYE</a:t>
+            </a:r>
+            <a:endParaRPr lang="en-US" sz="2400" dirty="0">
+              <a:solidFill>
+                <a:schemeClr val="accent1"/>
+              </a:solidFill>
+            </a:endParaRPr>
+          </a:p>
+        </p:txBody>
+      </p:sp>
+    </p:spTree>
+  </p:cSld>
+  <p:clrMapOvr>
+    <a:masterClrMapping/>
+  </p:clrMapOvr>
+  <p:timing>
+    <p:tnLst>
+      <p:par>
+        <p:cTn id="1" dur="indefinite" restart="never" nodeType="tmRoot"/>
+      </p:par>
+    </p:tnLst>
+  </p:timing>
+</p:sld>
+</file>
+
+<file path=ppt/slides/slide15.xml><?xml version="1.0" encoding="utf-8"?>
+<p:sld xmlns:a="http://schemas.openxmlformats.org/drawingml/2006/main" xmlns:r="http://schemas.openxmlformats.org/officeDocument/2006/relationships" xmlns:p="http://schemas.openxmlformats.org/presentationml/2006/main">
+  <p:cSld>
+    <p:spTree>
+      <p:nvGrpSpPr>
+        <p:cNvPr id="1" name=""/>
+        <p:cNvGrpSpPr/>
+        <p:nvPr/>
+      </p:nvGrpSpPr>
+      <p:grpSpPr>
+        <a:xfrm>
+          <a:off x="0" y="0"/>
+          <a:ext cx="0" cy="0"/>
+          <a:chOff x="0" y="0"/>
+          <a:chExt cx="0" cy="0"/>
+        </a:xfrm>
+      </p:grpSpPr>
+      <p:sp>
+        <p:nvSpPr>
+          <p:cNvPr id="2" name="Title 1"/>
+          <p:cNvSpPr>
+            <a:spLocks noGrp="1"/>
+          </p:cNvSpPr>
+          <p:nvPr>
+            <p:ph type="title"/>
+          </p:nvPr>
+        </p:nvSpPr>
+        <p:spPr/>
+        <p:txBody>
+          <a:bodyPr/>
+          <a:lstStyle/>
+          <a:p>
+            <a:r>
               <a:rPr lang="en-US" dirty="0" err="1" smtClean="0"/>
               <a:t>Rhino.Mocks</a:t>
             </a:r>
@@ -5984,13 +6209,7 @@
               <a:rPr lang="en-US" smtClean="0">
                 <a:hlinkClick r:id="rId3"/>
               </a:rPr>
-              <a:t>http</a:t>
-            </a:r>
-            <a:r>
-              <a:rPr lang="en-US" smtClean="0">
-                <a:hlinkClick r:id="rId3"/>
-              </a:rPr>
-              <a:t>://codeincubator.com</a:t>
+              <a:t>http://codeincubator.com</a:t>
             </a:r>
             <a:endParaRPr lang="en-US" dirty="0" smtClean="0"/>
           </a:p>

</xml_diff>